<commit_message>
Updates to Predictive Modeling pptx
</commit_message>
<xml_diff>
--- a/supplemental_topics/Predictive Modeling.pptx
+++ b/supplemental_topics/Predictive Modeling.pptx
@@ -17,6 +17,7 @@
     <p:sldId id="266" r:id="rId11"/>
     <p:sldId id="264" r:id="rId12"/>
     <p:sldId id="265" r:id="rId13"/>
+    <p:sldId id="268" r:id="rId14"/>
   </p:sldIdLst>
   <p:sldSz cx="12192000" cy="6858000"/>
   <p:notesSz cx="6858000" cy="9144000"/>
@@ -115,6 +116,11 @@
       </a:defRPr>
     </a:lvl9pPr>
   </p:defaultTextStyle>
+  <p:extLst>
+    <p:ext uri="{EFAFB233-063F-42B5-8137-9DF3F51BA10A}">
+      <p15:sldGuideLst xmlns:p15="http://schemas.microsoft.com/office/powerpoint/2012/main"/>
+    </p:ext>
+  </p:extLst>
 </p:presentation>
 </file>
 
@@ -265,7 +271,7 @@
           <a:p>
             <a:fld id="{33EF5DE8-8E3F-B64D-A9D4-9B5C0F4F36C2}" type="datetimeFigureOut">
               <a:rPr lang="en-US" smtClean="0"/>
-              <a:t>9/13/22</a:t>
+              <a:t>9/14/22</a:t>
             </a:fld>
             <a:endParaRPr lang="en-US"/>
           </a:p>
@@ -463,7 +469,7 @@
           <a:p>
             <a:fld id="{33EF5DE8-8E3F-B64D-A9D4-9B5C0F4F36C2}" type="datetimeFigureOut">
               <a:rPr lang="en-US" smtClean="0"/>
-              <a:t>9/13/22</a:t>
+              <a:t>9/14/22</a:t>
             </a:fld>
             <a:endParaRPr lang="en-US"/>
           </a:p>
@@ -671,7 +677,7 @@
           <a:p>
             <a:fld id="{33EF5DE8-8E3F-B64D-A9D4-9B5C0F4F36C2}" type="datetimeFigureOut">
               <a:rPr lang="en-US" smtClean="0"/>
-              <a:t>9/13/22</a:t>
+              <a:t>9/14/22</a:t>
             </a:fld>
             <a:endParaRPr lang="en-US"/>
           </a:p>
@@ -869,7 +875,7 @@
           <a:p>
             <a:fld id="{33EF5DE8-8E3F-B64D-A9D4-9B5C0F4F36C2}" type="datetimeFigureOut">
               <a:rPr lang="en-US" smtClean="0"/>
-              <a:t>9/13/22</a:t>
+              <a:t>9/14/22</a:t>
             </a:fld>
             <a:endParaRPr lang="en-US"/>
           </a:p>
@@ -1144,7 +1150,7 @@
           <a:p>
             <a:fld id="{33EF5DE8-8E3F-B64D-A9D4-9B5C0F4F36C2}" type="datetimeFigureOut">
               <a:rPr lang="en-US" smtClean="0"/>
-              <a:t>9/13/22</a:t>
+              <a:t>9/14/22</a:t>
             </a:fld>
             <a:endParaRPr lang="en-US"/>
           </a:p>
@@ -1409,7 +1415,7 @@
           <a:p>
             <a:fld id="{33EF5DE8-8E3F-B64D-A9D4-9B5C0F4F36C2}" type="datetimeFigureOut">
               <a:rPr lang="en-US" smtClean="0"/>
-              <a:t>9/13/22</a:t>
+              <a:t>9/14/22</a:t>
             </a:fld>
             <a:endParaRPr lang="en-US"/>
           </a:p>
@@ -1821,7 +1827,7 @@
           <a:p>
             <a:fld id="{33EF5DE8-8E3F-B64D-A9D4-9B5C0F4F36C2}" type="datetimeFigureOut">
               <a:rPr lang="en-US" smtClean="0"/>
-              <a:t>9/13/22</a:t>
+              <a:t>9/14/22</a:t>
             </a:fld>
             <a:endParaRPr lang="en-US"/>
           </a:p>
@@ -1962,7 +1968,7 @@
           <a:p>
             <a:fld id="{33EF5DE8-8E3F-B64D-A9D4-9B5C0F4F36C2}" type="datetimeFigureOut">
               <a:rPr lang="en-US" smtClean="0"/>
-              <a:t>9/13/22</a:t>
+              <a:t>9/14/22</a:t>
             </a:fld>
             <a:endParaRPr lang="en-US"/>
           </a:p>
@@ -2075,7 +2081,7 @@
           <a:p>
             <a:fld id="{33EF5DE8-8E3F-B64D-A9D4-9B5C0F4F36C2}" type="datetimeFigureOut">
               <a:rPr lang="en-US" smtClean="0"/>
-              <a:t>9/13/22</a:t>
+              <a:t>9/14/22</a:t>
             </a:fld>
             <a:endParaRPr lang="en-US"/>
           </a:p>
@@ -2386,7 +2392,7 @@
           <a:p>
             <a:fld id="{33EF5DE8-8E3F-B64D-A9D4-9B5C0F4F36C2}" type="datetimeFigureOut">
               <a:rPr lang="en-US" smtClean="0"/>
-              <a:t>9/13/22</a:t>
+              <a:t>9/14/22</a:t>
             </a:fld>
             <a:endParaRPr lang="en-US"/>
           </a:p>
@@ -2674,7 +2680,7 @@
           <a:p>
             <a:fld id="{33EF5DE8-8E3F-B64D-A9D4-9B5C0F4F36C2}" type="datetimeFigureOut">
               <a:rPr lang="en-US" smtClean="0"/>
-              <a:t>9/13/22</a:t>
+              <a:t>9/14/22</a:t>
             </a:fld>
             <a:endParaRPr lang="en-US"/>
           </a:p>
@@ -2915,7 +2921,7 @@
           <a:p>
             <a:fld id="{33EF5DE8-8E3F-B64D-A9D4-9B5C0F4F36C2}" type="datetimeFigureOut">
               <a:rPr lang="en-US" smtClean="0"/>
-              <a:t>9/13/22</a:t>
+              <a:t>9/14/22</a:t>
             </a:fld>
             <a:endParaRPr lang="en-US"/>
           </a:p>
@@ -4481,38 +4487,65 @@
           </a:p>
         </p:txBody>
       </p:sp>
-      <p:sp>
-        <p:nvSpPr>
-          <p:cNvPr id="3" name="Content Placeholder 2">
-            <a:extLst>
-              <a:ext uri="{FF2B5EF4-FFF2-40B4-BE49-F238E27FC236}">
-                <a16:creationId xmlns:a16="http://schemas.microsoft.com/office/drawing/2014/main" id="{DE5A25F2-52F6-BEAE-330B-443434637386}"/>
-              </a:ext>
-            </a:extLst>
-          </p:cNvPr>
-          <p:cNvSpPr>
-            <a:spLocks noGrp="1"/>
-          </p:cNvSpPr>
+      <p:pic>
+        <p:nvPicPr>
+          <p:cNvPr id="5" name="Content Placeholder 4" descr="Table&#10;&#10;Description automatically generated">
+            <a:extLst>
+              <a:ext uri="{FF2B5EF4-FFF2-40B4-BE49-F238E27FC236}">
+                <a16:creationId xmlns:a16="http://schemas.microsoft.com/office/drawing/2014/main" id="{D9D6344E-049C-5638-C152-13AE2D91A297}"/>
+              </a:ext>
+            </a:extLst>
+          </p:cNvPr>
+          <p:cNvPicPr>
+            <a:picLocks noGrp="1" noChangeAspect="1"/>
+          </p:cNvPicPr>
           <p:nvPr>
             <p:ph idx="1"/>
           </p:nvPr>
-        </p:nvSpPr>
+        </p:nvPicPr>
+        <p:blipFill>
+          <a:blip r:embed="rId2"/>
+          <a:stretch>
+            <a:fillRect/>
+          </a:stretch>
+        </p:blipFill>
         <p:spPr>
           <a:xfrm>
-            <a:off x="1367624" y="2490436"/>
-            <a:ext cx="9708995" cy="3567173"/>
-          </a:xfrm>
-        </p:spPr>
-        <p:txBody>
-          <a:bodyPr anchor="ctr">
-            <a:normAutofit/>
-          </a:bodyPr>
-          <a:lstStyle/>
-          <a:p>
-            <a:endParaRPr lang="en-US" sz="2400"/>
-          </a:p>
-        </p:txBody>
-      </p:sp>
+            <a:off x="1222645" y="2501826"/>
+            <a:ext cx="5564789" cy="3720459"/>
+          </a:xfrm>
+        </p:spPr>
+      </p:pic>
+      <p:pic>
+        <p:nvPicPr>
+          <p:cNvPr id="7" name="Picture 6" descr="Chart, scatter chart&#10;&#10;Description automatically generated">
+            <a:extLst>
+              <a:ext uri="{FF2B5EF4-FFF2-40B4-BE49-F238E27FC236}">
+                <a16:creationId xmlns:a16="http://schemas.microsoft.com/office/drawing/2014/main" id="{0A339A7E-8F25-4357-63A6-9D8F5370DB7F}"/>
+              </a:ext>
+            </a:extLst>
+          </p:cNvPr>
+          <p:cNvPicPr>
+            <a:picLocks noChangeAspect="1"/>
+          </p:cNvPicPr>
+          <p:nvPr/>
+        </p:nvPicPr>
+        <p:blipFill>
+          <a:blip r:embed="rId3"/>
+          <a:stretch>
+            <a:fillRect/>
+          </a:stretch>
+        </p:blipFill>
+        <p:spPr>
+          <a:xfrm>
+            <a:off x="7114230" y="2571226"/>
+            <a:ext cx="4544791" cy="3581657"/>
+          </a:xfrm>
+          <a:prstGeom prst="rect">
+            <a:avLst/>
+          </a:prstGeom>
+        </p:spPr>
+      </p:pic>
     </p:spTree>
     <p:extLst>
       <p:ext uri="{BB962C8B-B14F-4D97-AF65-F5344CB8AC3E}">
@@ -5140,7 +5173,44 @@
           </a:bodyPr>
           <a:lstStyle/>
           <a:p>
-            <a:endParaRPr lang="en-US" sz="2400"/>
+            <a:r>
+              <a:rPr lang="en-US" sz="2400" dirty="0"/>
+              <a:t>Many models can not handle missing data</a:t>
+            </a:r>
+          </a:p>
+          <a:p>
+            <a:r>
+              <a:rPr lang="en-US" sz="2400" dirty="0"/>
+              <a:t>There are several solutions to address this:</a:t>
+            </a:r>
+          </a:p>
+          <a:p>
+            <a:pPr lvl="1"/>
+            <a:r>
+              <a:rPr lang="en-US" sz="2000" dirty="0"/>
+              <a:t>Remove missing data rows</a:t>
+            </a:r>
+          </a:p>
+          <a:p>
+            <a:pPr lvl="1"/>
+            <a:r>
+              <a:rPr lang="en-US" sz="2000" dirty="0"/>
+              <a:t>Impute missing data</a:t>
+            </a:r>
+          </a:p>
+          <a:p>
+            <a:pPr lvl="2"/>
+            <a:r>
+              <a:rPr lang="en-US" sz="1600" dirty="0"/>
+              <a:t>Example: fill with the mean or most common category</a:t>
+            </a:r>
+          </a:p>
+          <a:p>
+            <a:pPr lvl="1"/>
+            <a:r>
+              <a:rPr lang="en-US" sz="2000" dirty="0"/>
+              <a:t>More sophisticated imputation methods exist</a:t>
+            </a:r>
           </a:p>
         </p:txBody>
       </p:sp>
@@ -5778,12 +5848,26 @@
             <a:endParaRPr lang="en-US" sz="2400" dirty="0"/>
           </a:p>
           <a:p>
+            <a:pPr lvl="1"/>
+            <a:r>
+              <a:rPr lang="en-US" sz="2000" dirty="0"/>
+              <a:t>Remove rows of the more common class</a:t>
+            </a:r>
+          </a:p>
+          <a:p>
             <a:r>
               <a:rPr lang="en-US" sz="2400" dirty="0"/>
               <a:t>Oversample</a:t>
             </a:r>
           </a:p>
           <a:p>
+            <a:pPr lvl="1"/>
+            <a:r>
+              <a:rPr lang="en-US" sz="2000" dirty="0"/>
+              <a:t>Replicate the minority class</a:t>
+            </a:r>
+          </a:p>
+          <a:p>
             <a:r>
               <a:rPr lang="en-US" sz="2400" dirty="0"/>
               <a:t>Synthetic Data</a:t>
@@ -5793,7 +5877,7 @@
             <a:pPr lvl="1"/>
             <a:r>
               <a:rPr lang="en-US" dirty="0"/>
-              <a:t>SMOTE</a:t>
+              <a:t>Create fake data based on observations and use those data in the model</a:t>
             </a:r>
           </a:p>
           <a:p>
@@ -5805,6 +5889,637 @@
     <p:extLst>
       <p:ext uri="{BB962C8B-B14F-4D97-AF65-F5344CB8AC3E}">
         <p14:creationId xmlns:p14="http://schemas.microsoft.com/office/powerpoint/2010/main" val="2858196027"/>
+      </p:ext>
+    </p:extLst>
+  </p:cSld>
+  <p:clrMapOvr>
+    <a:masterClrMapping/>
+  </p:clrMapOvr>
+</p:sld>
+</file>
+
+<file path=ppt/slides/slide13.xml><?xml version="1.0" encoding="utf-8"?>
+<p:sld xmlns:a="http://schemas.openxmlformats.org/drawingml/2006/main" xmlns:r="http://schemas.openxmlformats.org/officeDocument/2006/relationships" xmlns:p="http://schemas.openxmlformats.org/presentationml/2006/main">
+  <p:cSld>
+    <p:bg>
+      <p:bgPr>
+        <a:solidFill>
+          <a:schemeClr val="bg1"/>
+        </a:solidFill>
+        <a:effectLst/>
+      </p:bgPr>
+    </p:bg>
+    <p:spTree>
+      <p:nvGrpSpPr>
+        <p:cNvPr id="1" name=""/>
+        <p:cNvGrpSpPr/>
+        <p:nvPr/>
+      </p:nvGrpSpPr>
+      <p:grpSpPr>
+        <a:xfrm>
+          <a:off x="0" y="0"/>
+          <a:ext cx="0" cy="0"/>
+          <a:chOff x="0" y="0"/>
+          <a:chExt cx="0" cy="0"/>
+        </a:xfrm>
+      </p:grpSpPr>
+      <p:sp useBgFill="1">
+        <p:nvSpPr>
+          <p:cNvPr id="10" name="Rectangle 9">
+            <a:extLst>
+              <a:ext uri="{FF2B5EF4-FFF2-40B4-BE49-F238E27FC236}">
+                <a16:creationId xmlns:a16="http://schemas.microsoft.com/office/drawing/2014/main" id="{6F5A5072-7B47-4D32-B52A-4EBBF590B8A5}"/>
+              </a:ext>
+              <a:ext uri="{C183D7F6-B498-43B3-948B-1728B52AA6E4}">
+                <adec:decorative xmlns:adec="http://schemas.microsoft.com/office/drawing/2017/decorative" val="1"/>
+              </a:ext>
+            </a:extLst>
+          </p:cNvPr>
+          <p:cNvSpPr>
+            <a:spLocks noGrp="1" noRot="1" noChangeAspect="1" noMove="1" noResize="1" noEditPoints="1" noAdjustHandles="1" noChangeArrowheads="1" noChangeShapeType="1" noTextEdit="1"/>
+          </p:cNvSpPr>
+          <p:nvPr>
+            <p:extLst>
+              <p:ext uri="{386F3935-93C4-4BCD-93E2-E3B085C9AB24}">
+                <p16:designElem xmlns:p16="http://schemas.microsoft.com/office/powerpoint/2015/main" val="1"/>
+              </p:ext>
+            </p:extLst>
+          </p:nvPr>
+        </p:nvSpPr>
+        <p:spPr>
+          <a:xfrm>
+            <a:off x="0" y="0"/>
+            <a:ext cx="12192000" cy="6858000"/>
+          </a:xfrm>
+          <a:prstGeom prst="rect">
+            <a:avLst/>
+          </a:prstGeom>
+          <a:ln w="12700" cap="flat" cmpd="sng" algn="ctr">
+            <a:noFill/>
+            <a:prstDash val="solid"/>
+            <a:miter lim="800000"/>
+          </a:ln>
+          <a:effectLst/>
+          <a:extLst>
+            <a:ext uri="{91240B29-F687-4F45-9708-019B960494DF}">
+              <a14:hiddenLine xmlns:a14="http://schemas.microsoft.com/office/drawing/2010/main" w="12700" cap="flat" cmpd="sng" algn="ctr">
+                <a:solidFill>
+                  <a:schemeClr val="accent1">
+                    <a:shade val="50000"/>
+                  </a:schemeClr>
+                </a:solidFill>
+                <a:prstDash val="solid"/>
+                <a:miter lim="800000"/>
+              </a14:hiddenLine>
+            </a:ext>
+          </a:extLst>
+        </p:spPr>
+        <p:style>
+          <a:lnRef idx="2">
+            <a:schemeClr val="accent1">
+              <a:shade val="50000"/>
+            </a:schemeClr>
+          </a:lnRef>
+          <a:fillRef idx="1">
+            <a:schemeClr val="accent1"/>
+          </a:fillRef>
+          <a:effectRef idx="0">
+            <a:schemeClr val="accent1"/>
+          </a:effectRef>
+          <a:fontRef idx="minor">
+            <a:schemeClr val="lt1"/>
+          </a:fontRef>
+        </p:style>
+        <p:txBody>
+          <a:bodyPr rtlCol="0" anchor="ctr"/>
+          <a:lstStyle/>
+          <a:p>
+            <a:pPr algn="ctr"/>
+            <a:endParaRPr lang="en-US"/>
+          </a:p>
+        </p:txBody>
+      </p:sp>
+      <p:sp>
+        <p:nvSpPr>
+          <p:cNvPr id="12" name="Rectangle 11">
+            <a:extLst>
+              <a:ext uri="{FF2B5EF4-FFF2-40B4-BE49-F238E27FC236}">
+                <a16:creationId xmlns:a16="http://schemas.microsoft.com/office/drawing/2014/main" id="{9715DAF0-AE1B-46C9-8A6B-DB2AA05AB91D}"/>
+              </a:ext>
+              <a:ext uri="{C183D7F6-B498-43B3-948B-1728B52AA6E4}">
+                <adec:decorative xmlns:adec="http://schemas.microsoft.com/office/drawing/2017/decorative" val="1"/>
+              </a:ext>
+            </a:extLst>
+          </p:cNvPr>
+          <p:cNvSpPr>
+            <a:spLocks noGrp="1" noRot="1" noChangeAspect="1" noMove="1" noResize="1" noEditPoints="1" noAdjustHandles="1" noChangeArrowheads="1" noChangeShapeType="1" noTextEdit="1"/>
+          </p:cNvSpPr>
+          <p:nvPr>
+            <p:extLst>
+              <p:ext uri="{386F3935-93C4-4BCD-93E2-E3B085C9AB24}">
+                <p16:designElem xmlns:p16="http://schemas.microsoft.com/office/powerpoint/2015/main" val="1"/>
+              </p:ext>
+            </p:extLst>
+          </p:nvPr>
+        </p:nvSpPr>
+        <p:spPr>
+          <a:xfrm rot="10800000">
+            <a:off x="-2" y="-22693"/>
+            <a:ext cx="12191999" cy="4374129"/>
+          </a:xfrm>
+          <a:prstGeom prst="rect">
+            <a:avLst/>
+          </a:prstGeom>
+          <a:gradFill>
+            <a:gsLst>
+              <a:gs pos="0">
+                <a:schemeClr val="accent1">
+                  <a:lumMod val="75000"/>
+                </a:schemeClr>
+              </a:gs>
+              <a:gs pos="100000">
+                <a:srgbClr val="000000"/>
+              </a:gs>
+            </a:gsLst>
+            <a:lin ang="15000000" scaled="0"/>
+          </a:gradFill>
+          <a:ln>
+            <a:noFill/>
+          </a:ln>
+        </p:spPr>
+        <p:style>
+          <a:lnRef idx="2">
+            <a:schemeClr val="accent1">
+              <a:shade val="50000"/>
+            </a:schemeClr>
+          </a:lnRef>
+          <a:fillRef idx="1">
+            <a:schemeClr val="accent1"/>
+          </a:fillRef>
+          <a:effectRef idx="0">
+            <a:schemeClr val="accent1"/>
+          </a:effectRef>
+          <a:fontRef idx="minor">
+            <a:schemeClr val="lt1"/>
+          </a:fontRef>
+        </p:style>
+        <p:txBody>
+          <a:bodyPr rtlCol="0" anchor="ctr"/>
+          <a:lstStyle/>
+          <a:p>
+            <a:pPr algn="ctr"/>
+            <a:endParaRPr lang="en-US"/>
+          </a:p>
+        </p:txBody>
+      </p:sp>
+      <p:sp>
+        <p:nvSpPr>
+          <p:cNvPr id="14" name="Rectangle 13">
+            <a:extLst>
+              <a:ext uri="{FF2B5EF4-FFF2-40B4-BE49-F238E27FC236}">
+                <a16:creationId xmlns:a16="http://schemas.microsoft.com/office/drawing/2014/main" id="{6016219D-510E-4184-9090-6D5578A87BD1}"/>
+              </a:ext>
+              <a:ext uri="{C183D7F6-B498-43B3-948B-1728B52AA6E4}">
+                <adec:decorative xmlns:adec="http://schemas.microsoft.com/office/drawing/2017/decorative" val="1"/>
+              </a:ext>
+            </a:extLst>
+          </p:cNvPr>
+          <p:cNvSpPr>
+            <a:spLocks noGrp="1" noRot="1" noChangeAspect="1" noMove="1" noResize="1" noEditPoints="1" noAdjustHandles="1" noChangeArrowheads="1" noChangeShapeType="1" noTextEdit="1"/>
+          </p:cNvSpPr>
+          <p:nvPr>
+            <p:extLst>
+              <p:ext uri="{386F3935-93C4-4BCD-93E2-E3B085C9AB24}">
+                <p16:designElem xmlns:p16="http://schemas.microsoft.com/office/powerpoint/2015/main" val="1"/>
+              </p:ext>
+            </p:extLst>
+          </p:nvPr>
+        </p:nvSpPr>
+        <p:spPr>
+          <a:xfrm rot="5400000">
+            <a:off x="3908719" y="-3931841"/>
+            <a:ext cx="4374557" cy="12192000"/>
+          </a:xfrm>
+          <a:prstGeom prst="rect">
+            <a:avLst/>
+          </a:prstGeom>
+          <a:gradFill>
+            <a:gsLst>
+              <a:gs pos="40000">
+                <a:schemeClr val="accent1">
+                  <a:alpha val="0"/>
+                </a:schemeClr>
+              </a:gs>
+              <a:gs pos="100000">
+                <a:schemeClr val="accent1">
+                  <a:lumMod val="75000"/>
+                  <a:alpha val="52000"/>
+                </a:schemeClr>
+              </a:gs>
+            </a:gsLst>
+            <a:lin ang="2400000" scaled="0"/>
+          </a:gradFill>
+          <a:ln>
+            <a:noFill/>
+          </a:ln>
+        </p:spPr>
+        <p:style>
+          <a:lnRef idx="2">
+            <a:schemeClr val="accent1">
+              <a:shade val="50000"/>
+            </a:schemeClr>
+          </a:lnRef>
+          <a:fillRef idx="1">
+            <a:schemeClr val="accent1"/>
+          </a:fillRef>
+          <a:effectRef idx="0">
+            <a:schemeClr val="accent1"/>
+          </a:effectRef>
+          <a:fontRef idx="minor">
+            <a:schemeClr val="lt1"/>
+          </a:fontRef>
+        </p:style>
+        <p:txBody>
+          <a:bodyPr rtlCol="0" anchor="ctr"/>
+          <a:lstStyle/>
+          <a:p>
+            <a:pPr algn="ctr"/>
+            <a:endParaRPr lang="en-US"/>
+          </a:p>
+        </p:txBody>
+      </p:sp>
+      <p:sp>
+        <p:nvSpPr>
+          <p:cNvPr id="16" name="Rectangle 15">
+            <a:extLst>
+              <a:ext uri="{FF2B5EF4-FFF2-40B4-BE49-F238E27FC236}">
+                <a16:creationId xmlns:a16="http://schemas.microsoft.com/office/drawing/2014/main" id="{AFF4A713-7B75-4B21-90D7-5AB19547C728}"/>
+              </a:ext>
+              <a:ext uri="{C183D7F6-B498-43B3-948B-1728B52AA6E4}">
+                <adec:decorative xmlns:adec="http://schemas.microsoft.com/office/drawing/2017/decorative" val="1"/>
+              </a:ext>
+            </a:extLst>
+          </p:cNvPr>
+          <p:cNvSpPr>
+            <a:spLocks noGrp="1" noRot="1" noChangeAspect="1" noMove="1" noResize="1" noEditPoints="1" noAdjustHandles="1" noChangeArrowheads="1" noChangeShapeType="1" noTextEdit="1"/>
+          </p:cNvSpPr>
+          <p:nvPr>
+            <p:extLst>
+              <p:ext uri="{386F3935-93C4-4BCD-93E2-E3B085C9AB24}">
+                <p16:designElem xmlns:p16="http://schemas.microsoft.com/office/powerpoint/2015/main" val="1"/>
+              </p:ext>
+            </p:extLst>
+          </p:nvPr>
+        </p:nvSpPr>
+        <p:spPr>
+          <a:xfrm rot="5400000">
+            <a:off x="4136696" y="-3703868"/>
+            <a:ext cx="4374128" cy="11736479"/>
+          </a:xfrm>
+          <a:prstGeom prst="rect">
+            <a:avLst/>
+          </a:prstGeom>
+          <a:gradFill>
+            <a:gsLst>
+              <a:gs pos="17000">
+                <a:schemeClr val="accent1">
+                  <a:alpha val="0"/>
+                </a:schemeClr>
+              </a:gs>
+              <a:gs pos="100000">
+                <a:srgbClr val="000000">
+                  <a:alpha val="37000"/>
+                </a:srgbClr>
+              </a:gs>
+            </a:gsLst>
+            <a:lin ang="7800000" scaled="0"/>
+          </a:gradFill>
+          <a:ln>
+            <a:noFill/>
+          </a:ln>
+        </p:spPr>
+        <p:style>
+          <a:lnRef idx="2">
+            <a:schemeClr val="accent1">
+              <a:shade val="50000"/>
+            </a:schemeClr>
+          </a:lnRef>
+          <a:fillRef idx="1">
+            <a:schemeClr val="accent1"/>
+          </a:fillRef>
+          <a:effectRef idx="0">
+            <a:schemeClr val="accent1"/>
+          </a:effectRef>
+          <a:fontRef idx="minor">
+            <a:schemeClr val="lt1"/>
+          </a:fontRef>
+        </p:style>
+        <p:txBody>
+          <a:bodyPr rtlCol="0" anchor="ctr"/>
+          <a:lstStyle/>
+          <a:p>
+            <a:pPr algn="ctr"/>
+            <a:endParaRPr lang="en-US"/>
+          </a:p>
+        </p:txBody>
+      </p:sp>
+      <p:sp>
+        <p:nvSpPr>
+          <p:cNvPr id="18" name="Rectangle 17">
+            <a:extLst>
+              <a:ext uri="{FF2B5EF4-FFF2-40B4-BE49-F238E27FC236}">
+                <a16:creationId xmlns:a16="http://schemas.microsoft.com/office/drawing/2014/main" id="{DC631C0B-6DA6-4E57-8231-CE32B3434A7E}"/>
+              </a:ext>
+              <a:ext uri="{C183D7F6-B498-43B3-948B-1728B52AA6E4}">
+                <adec:decorative xmlns:adec="http://schemas.microsoft.com/office/drawing/2017/decorative" val="1"/>
+              </a:ext>
+            </a:extLst>
+          </p:cNvPr>
+          <p:cNvSpPr>
+            <a:spLocks noGrp="1" noRot="1" noChangeAspect="1" noMove="1" noResize="1" noEditPoints="1" noAdjustHandles="1" noChangeArrowheads="1" noChangeShapeType="1" noTextEdit="1"/>
+          </p:cNvSpPr>
+          <p:nvPr>
+            <p:extLst>
+              <p:ext uri="{386F3935-93C4-4BCD-93E2-E3B085C9AB24}">
+                <p16:designElem xmlns:p16="http://schemas.microsoft.com/office/powerpoint/2015/main" val="1"/>
+              </p:ext>
+            </p:extLst>
+          </p:nvPr>
+        </p:nvSpPr>
+        <p:spPr>
+          <a:xfrm>
+            <a:off x="-5" y="-22690"/>
+            <a:ext cx="8542485" cy="4374126"/>
+          </a:xfrm>
+          <a:prstGeom prst="rect">
+            <a:avLst/>
+          </a:prstGeom>
+          <a:gradFill>
+            <a:gsLst>
+              <a:gs pos="0">
+                <a:schemeClr val="accent1">
+                  <a:lumMod val="50000"/>
+                  <a:alpha val="0"/>
+                </a:schemeClr>
+              </a:gs>
+              <a:gs pos="100000">
+                <a:srgbClr val="000000">
+                  <a:alpha val="25000"/>
+                </a:srgbClr>
+              </a:gs>
+            </a:gsLst>
+            <a:lin ang="18600000" scaled="0"/>
+          </a:gradFill>
+          <a:ln>
+            <a:noFill/>
+          </a:ln>
+        </p:spPr>
+        <p:style>
+          <a:lnRef idx="2">
+            <a:schemeClr val="accent1">
+              <a:shade val="50000"/>
+            </a:schemeClr>
+          </a:lnRef>
+          <a:fillRef idx="1">
+            <a:schemeClr val="accent1"/>
+          </a:fillRef>
+          <a:effectRef idx="0">
+            <a:schemeClr val="accent1"/>
+          </a:effectRef>
+          <a:fontRef idx="minor">
+            <a:schemeClr val="lt1"/>
+          </a:fontRef>
+        </p:style>
+        <p:txBody>
+          <a:bodyPr rtlCol="0" anchor="ctr"/>
+          <a:lstStyle/>
+          <a:p>
+            <a:pPr algn="ctr"/>
+            <a:endParaRPr lang="en-US"/>
+          </a:p>
+        </p:txBody>
+      </p:sp>
+      <p:sp>
+        <p:nvSpPr>
+          <p:cNvPr id="20" name="Freeform: Shape 19">
+            <a:extLst>
+              <a:ext uri="{FF2B5EF4-FFF2-40B4-BE49-F238E27FC236}">
+                <a16:creationId xmlns:a16="http://schemas.microsoft.com/office/drawing/2014/main" id="{C29501E6-A978-4A61-9689-9085AF97A53A}"/>
+              </a:ext>
+              <a:ext uri="{C183D7F6-B498-43B3-948B-1728B52AA6E4}">
+                <adec:decorative xmlns:adec="http://schemas.microsoft.com/office/drawing/2017/decorative" val="1"/>
+              </a:ext>
+            </a:extLst>
+          </p:cNvPr>
+          <p:cNvSpPr>
+            <a:spLocks noGrp="1" noRot="1" noChangeAspect="1" noMove="1" noResize="1" noEditPoints="1" noAdjustHandles="1" noChangeArrowheads="1" noChangeShapeType="1" noTextEdit="1"/>
+          </p:cNvSpPr>
+          <p:nvPr>
+            <p:extLst>
+              <p:ext uri="{386F3935-93C4-4BCD-93E2-E3B085C9AB24}">
+                <p16:designElem xmlns:p16="http://schemas.microsoft.com/office/powerpoint/2015/main" val="1"/>
+              </p:ext>
+            </p:extLst>
+          </p:nvPr>
+        </p:nvSpPr>
+        <p:spPr>
+          <a:xfrm rot="12508972">
+            <a:off x="5945431" y="-1032053"/>
+            <a:ext cx="4990147" cy="4439131"/>
+          </a:xfrm>
+          <a:custGeom>
+            <a:avLst/>
+            <a:gdLst>
+              <a:gd name="connsiteX0" fmla="*/ 4990147 w 4990147"/>
+              <a:gd name="connsiteY0" fmla="*/ 2229378 h 4439131"/>
+              <a:gd name="connsiteX1" fmla="*/ 917384 w 4990147"/>
+              <a:gd name="connsiteY1" fmla="*/ 4439131 h 4439131"/>
+              <a:gd name="connsiteX2" fmla="*/ 910814 w 4990147"/>
+              <a:gd name="connsiteY2" fmla="*/ 4434219 h 4439131"/>
+              <a:gd name="connsiteX3" fmla="*/ 0 w 4990147"/>
+              <a:gd name="connsiteY3" fmla="*/ 2502877 h 4439131"/>
+              <a:gd name="connsiteX4" fmla="*/ 2502877 w 4990147"/>
+              <a:gd name="connsiteY4" fmla="*/ 0 h 4439131"/>
+              <a:gd name="connsiteX5" fmla="*/ 4954904 w 4990147"/>
+              <a:gd name="connsiteY5" fmla="*/ 1998460 h 4439131"/>
+            </a:gdLst>
+            <a:ahLst/>
+            <a:cxnLst>
+              <a:cxn ang="0">
+                <a:pos x="connsiteX0" y="connsiteY0"/>
+              </a:cxn>
+              <a:cxn ang="0">
+                <a:pos x="connsiteX1" y="connsiteY1"/>
+              </a:cxn>
+              <a:cxn ang="0">
+                <a:pos x="connsiteX2" y="connsiteY2"/>
+              </a:cxn>
+              <a:cxn ang="0">
+                <a:pos x="connsiteX3" y="connsiteY3"/>
+              </a:cxn>
+              <a:cxn ang="0">
+                <a:pos x="connsiteX4" y="connsiteY4"/>
+              </a:cxn>
+              <a:cxn ang="0">
+                <a:pos x="connsiteX5" y="connsiteY5"/>
+              </a:cxn>
+            </a:cxnLst>
+            <a:rect l="l" t="t" r="r" b="b"/>
+            <a:pathLst>
+              <a:path w="4990147" h="4439131">
+                <a:moveTo>
+                  <a:pt x="4990147" y="2229378"/>
+                </a:moveTo>
+                <a:lnTo>
+                  <a:pt x="917384" y="4439131"/>
+                </a:lnTo>
+                <a:lnTo>
+                  <a:pt x="910814" y="4434219"/>
+                </a:lnTo>
+                <a:cubicBezTo>
+                  <a:pt x="354557" y="3975154"/>
+                  <a:pt x="0" y="3280421"/>
+                  <a:pt x="0" y="2502877"/>
+                </a:cubicBezTo>
+                <a:cubicBezTo>
+                  <a:pt x="0" y="1120576"/>
+                  <a:pt x="1120576" y="0"/>
+                  <a:pt x="2502877" y="0"/>
+                </a:cubicBezTo>
+                <a:cubicBezTo>
+                  <a:pt x="3712390" y="0"/>
+                  <a:pt x="4721520" y="857941"/>
+                  <a:pt x="4954904" y="1998460"/>
+                </a:cubicBezTo>
+                <a:close/>
+              </a:path>
+            </a:pathLst>
+          </a:custGeom>
+          <a:gradFill>
+            <a:gsLst>
+              <a:gs pos="0">
+                <a:schemeClr val="accent1">
+                  <a:alpha val="22000"/>
+                </a:schemeClr>
+              </a:gs>
+              <a:gs pos="87000">
+                <a:schemeClr val="accent1">
+                  <a:lumMod val="60000"/>
+                  <a:lumOff val="40000"/>
+                  <a:alpha val="2000"/>
+                </a:schemeClr>
+              </a:gs>
+            </a:gsLst>
+            <a:lin ang="8400000" scaled="0"/>
+          </a:gradFill>
+          <a:ln>
+            <a:noFill/>
+          </a:ln>
+        </p:spPr>
+        <p:style>
+          <a:lnRef idx="2">
+            <a:schemeClr val="accent1">
+              <a:shade val="50000"/>
+            </a:schemeClr>
+          </a:lnRef>
+          <a:fillRef idx="1">
+            <a:schemeClr val="accent1"/>
+          </a:fillRef>
+          <a:effectRef idx="0">
+            <a:schemeClr val="accent1"/>
+          </a:effectRef>
+          <a:fontRef idx="minor">
+            <a:schemeClr val="lt1"/>
+          </a:fontRef>
+        </p:style>
+        <p:txBody>
+          <a:bodyPr wrap="square" rtlCol="0" anchor="ctr">
+            <a:noAutofit/>
+          </a:bodyPr>
+          <a:lstStyle/>
+          <a:p>
+            <a:pPr algn="ctr"/>
+            <a:endParaRPr lang="en-US" dirty="0"/>
+          </a:p>
+        </p:txBody>
+      </p:sp>
+      <p:sp>
+        <p:nvSpPr>
+          <p:cNvPr id="4" name="Title 3">
+            <a:extLst>
+              <a:ext uri="{FF2B5EF4-FFF2-40B4-BE49-F238E27FC236}">
+                <a16:creationId xmlns:a16="http://schemas.microsoft.com/office/drawing/2014/main" id="{946DCB35-E9D9-093C-59F9-D6D2640742E0}"/>
+              </a:ext>
+            </a:extLst>
+          </p:cNvPr>
+          <p:cNvSpPr>
+            <a:spLocks noGrp="1"/>
+          </p:cNvSpPr>
+          <p:nvPr>
+            <p:ph type="ctrTitle"/>
+          </p:nvPr>
+        </p:nvSpPr>
+        <p:spPr>
+          <a:xfrm>
+            <a:off x="1314824" y="735106"/>
+            <a:ext cx="10053763" cy="2928470"/>
+          </a:xfrm>
+        </p:spPr>
+        <p:txBody>
+          <a:bodyPr anchor="b">
+            <a:normAutofit/>
+          </a:bodyPr>
+          <a:lstStyle/>
+          <a:p>
+            <a:pPr algn="l"/>
+            <a:r>
+              <a:rPr lang="en-US" sz="4800" dirty="0">
+                <a:solidFill>
+                  <a:srgbClr val="FFFFFF"/>
+                </a:solidFill>
+              </a:rPr>
+              <a:t>Questions?</a:t>
+            </a:r>
+          </a:p>
+        </p:txBody>
+      </p:sp>
+      <p:sp>
+        <p:nvSpPr>
+          <p:cNvPr id="5" name="Subtitle 4">
+            <a:extLst>
+              <a:ext uri="{FF2B5EF4-FFF2-40B4-BE49-F238E27FC236}">
+                <a16:creationId xmlns:a16="http://schemas.microsoft.com/office/drawing/2014/main" id="{33B46975-C3AE-38DC-BE6E-E08A1204F0D9}"/>
+              </a:ext>
+            </a:extLst>
+          </p:cNvPr>
+          <p:cNvSpPr>
+            <a:spLocks noGrp="1"/>
+          </p:cNvSpPr>
+          <p:nvPr>
+            <p:ph type="subTitle" idx="1"/>
+          </p:nvPr>
+        </p:nvSpPr>
+        <p:spPr>
+          <a:xfrm>
+            <a:off x="1350682" y="4870824"/>
+            <a:ext cx="10005951" cy="1458258"/>
+          </a:xfrm>
+        </p:spPr>
+        <p:txBody>
+          <a:bodyPr anchor="ctr">
+            <a:normAutofit/>
+          </a:bodyPr>
+          <a:lstStyle/>
+          <a:p>
+            <a:pPr algn="l"/>
+            <a:endParaRPr lang="en-US"/>
+          </a:p>
+        </p:txBody>
+      </p:sp>
+    </p:spTree>
+    <p:extLst>
+      <p:ext uri="{BB962C8B-B14F-4D97-AF65-F5344CB8AC3E}">
+        <p14:creationId xmlns:p14="http://schemas.microsoft.com/office/powerpoint/2010/main" val="467154497"/>
       </p:ext>
     </p:extLst>
   </p:cSld>
@@ -10356,7 +11071,7 @@
         </p:spPr>
         <p:txBody>
           <a:bodyPr anchor="ctr">
-            <a:normAutofit/>
+            <a:normAutofit fontScale="92500" lnSpcReduction="10000"/>
           </a:bodyPr>
           <a:lstStyle/>
           <a:p>
@@ -10375,21 +11090,54 @@
           <a:p>
             <a:r>
               <a:rPr lang="en-US" sz="2400" dirty="0"/>
-              <a:t>Sensitivity</a:t>
+              <a:t>Sensitivity (TP/(TP+FN))</a:t>
+            </a:r>
+          </a:p>
+          <a:p>
+            <a:pPr lvl="1"/>
+            <a:r>
+              <a:rPr lang="en-US" sz="2000" dirty="0"/>
+              <a:t>True positive rate</a:t>
             </a:r>
           </a:p>
           <a:p>
             <a:r>
               <a:rPr lang="en-US" sz="2400" dirty="0"/>
-              <a:t>Specificity</a:t>
-            </a:r>
-          </a:p>
-          <a:p>
-            <a:r>
-              <a:rPr lang="en-US" sz="2400"/>
-              <a:t>F2-Score</a:t>
-            </a:r>
-            <a:endParaRPr lang="en-US" sz="2400" dirty="0"/>
+              <a:t>Specificity (TN/(TN+FP))</a:t>
+            </a:r>
+          </a:p>
+          <a:p>
+            <a:pPr lvl="1"/>
+            <a:r>
+              <a:rPr lang="en-US" sz="2000" dirty="0"/>
+              <a:t>True negative rate</a:t>
+            </a:r>
+          </a:p>
+          <a:p>
+            <a:r>
+              <a:rPr lang="en-US" sz="2400" dirty="0"/>
+              <a:t>Precision (TP/(TP+FP))</a:t>
+            </a:r>
+          </a:p>
+          <a:p>
+            <a:pPr lvl="1"/>
+            <a:r>
+              <a:rPr lang="en-US" sz="2000" dirty="0"/>
+              <a:t>Positive prediction value</a:t>
+            </a:r>
+          </a:p>
+          <a:p>
+            <a:r>
+              <a:rPr lang="en-US" sz="2400" dirty="0"/>
+              <a:t>F1-Score (2TP/(2TP+FP+FN))</a:t>
+            </a:r>
+          </a:p>
+          <a:p>
+            <a:pPr lvl="1"/>
+            <a:r>
+              <a:rPr lang="en-US" sz="2000" dirty="0"/>
+              <a:t>Harmonic mean of precisions and sensitivity </a:t>
+            </a:r>
           </a:p>
         </p:txBody>
       </p:sp>

</xml_diff>